<commit_message>
Update: doc - experience work re-order
</commit_message>
<xml_diff>
--- a/files/asset/document/FinalTask_Kalbe_DE_Ricky_Suhanry.pptx
+++ b/files/asset/document/FinalTask_Kalbe_DE_Ricky_Suhanry.pptx
@@ -15200,7 +15200,7 @@
         </p:nvSpPr>
         <p:spPr>
           <a:xfrm>
-            <a:off x="5294775" y="1625150"/>
+            <a:off x="5338500" y="3807075"/>
             <a:ext cx="3740100" cy="400200"/>
           </a:xfrm>
           <a:prstGeom prst="rect">
@@ -15263,7 +15263,7 @@
         </p:nvSpPr>
         <p:spPr>
           <a:xfrm>
-            <a:off x="5294775" y="2709450"/>
+            <a:off x="5374400" y="2688000"/>
             <a:ext cx="3740100" cy="400200"/>
           </a:xfrm>
           <a:prstGeom prst="rect">
@@ -15326,7 +15326,7 @@
         </p:nvSpPr>
         <p:spPr>
           <a:xfrm>
-            <a:off x="5294775" y="3861975"/>
+            <a:off x="5410300" y="1555513"/>
             <a:ext cx="3740100" cy="400200"/>
           </a:xfrm>
           <a:prstGeom prst="rect">
@@ -15452,7 +15452,7 @@
         </p:nvSpPr>
         <p:spPr>
           <a:xfrm>
-            <a:off x="5330675" y="1911275"/>
+            <a:off x="5374400" y="4093200"/>
             <a:ext cx="2061900" cy="338700"/>
           </a:xfrm>
           <a:prstGeom prst="rect">
@@ -15524,7 +15524,7 @@
         </p:nvSpPr>
         <p:spPr>
           <a:xfrm>
-            <a:off x="5330675" y="2198725"/>
+            <a:off x="5374400" y="4380650"/>
             <a:ext cx="3740100" cy="338700"/>
           </a:xfrm>
           <a:prstGeom prst="rect">
@@ -15565,7 +15565,7 @@
                 <a:cs typeface="Rubik"/>
                 <a:sym typeface="Rubik"/>
               </a:rPr>
-              <a:t>June - </a:t>
+              <a:t>May - </a:t>
             </a:r>
             <a:r>
               <a:rPr lang="en" sz="1000">
@@ -15605,7 +15605,7 @@
         </p:nvSpPr>
         <p:spPr>
           <a:xfrm>
-            <a:off x="5330675" y="3061325"/>
+            <a:off x="5410300" y="3039875"/>
             <a:ext cx="2061900" cy="338700"/>
           </a:xfrm>
           <a:prstGeom prst="rect">
@@ -15668,7 +15668,7 @@
         </p:nvSpPr>
         <p:spPr>
           <a:xfrm>
-            <a:off x="5330675" y="3316450"/>
+            <a:off x="5410300" y="3295000"/>
             <a:ext cx="3740100" cy="338700"/>
           </a:xfrm>
           <a:prstGeom prst="rect">
@@ -15740,7 +15740,7 @@
         </p:nvSpPr>
         <p:spPr>
           <a:xfrm>
-            <a:off x="5330675" y="4434175"/>
+            <a:off x="5446200" y="2127713"/>
             <a:ext cx="3740100" cy="338700"/>
           </a:xfrm>
           <a:prstGeom prst="rect">
@@ -15812,7 +15812,7 @@
         </p:nvSpPr>
         <p:spPr>
           <a:xfrm>
-            <a:off x="5330675" y="4211375"/>
+            <a:off x="5446200" y="1904913"/>
             <a:ext cx="2061900" cy="338700"/>
           </a:xfrm>
           <a:prstGeom prst="rect">

</xml_diff>